<commit_message>
Energy router feature and roadmap updated.
</commit_message>
<xml_diff>
--- a/Reference_Implementation/images/energy_route_roadmap_milestone.pptx
+++ b/Reference_Implementation/images/energy_route_roadmap_milestone.pptx
@@ -5862,8 +5862,8 @@
         </p:nvSpPr>
         <p:spPr>
           <a:xfrm>
-            <a:off x="4893310" y="2475230"/>
-            <a:ext cx="1444625" cy="299720"/>
+            <a:off x="4693920" y="2475230"/>
+            <a:ext cx="1866265" cy="299720"/>
           </a:xfrm>
           <a:prstGeom prst="rect">
             <a:avLst/>
@@ -5889,7 +5889,7 @@
                 <a:ea typeface="等线 Light" panose="02010600030101010101" charset="-122"/>
                 <a:cs typeface="Courier New" panose="02070309020205020404" pitchFamily="49" charset="0"/>
               </a:rPr>
-              <a:t>#2 DC Coupling</a:t>
+              <a:t>#2 DC Coupling Hybrid</a:t>
             </a:r>
             <a:endParaRPr lang="zh-CN" altLang="en-US" sz="1000">
               <a:latin typeface="Courier New" panose="02070309020205020404" pitchFamily="49" charset="0"/>
@@ -6048,8 +6048,8 @@
         </p:nvSpPr>
         <p:spPr>
           <a:xfrm>
-            <a:off x="3649345" y="4102100"/>
-            <a:ext cx="1383030" cy="299720"/>
+            <a:off x="3259455" y="4102100"/>
+            <a:ext cx="2340610" cy="299720"/>
           </a:xfrm>
           <a:prstGeom prst="rect">
             <a:avLst/>
@@ -6075,7 +6075,7 @@
                 <a:ea typeface="等线 Light" panose="02010600030101010101" charset="-122"/>
                 <a:cs typeface="Courier New" panose="02070309020205020404" pitchFamily="49" charset="0"/>
               </a:rPr>
-              <a:t>Supoer Charge</a:t>
+              <a:t>Super Charge / Automation</a:t>
             </a:r>
             <a:endParaRPr lang="en-US" altLang="zh-CN" sz="1000">
               <a:latin typeface="Courier New" panose="02070309020205020404" pitchFamily="49" charset="0"/>
@@ -6899,8 +6899,8 @@
         </p:nvSpPr>
         <p:spPr>
           <a:xfrm>
-            <a:off x="5723255" y="4102100"/>
-            <a:ext cx="1269365" cy="299720"/>
+            <a:off x="5609590" y="4102100"/>
+            <a:ext cx="1383030" cy="299720"/>
           </a:xfrm>
           <a:prstGeom prst="rect">
             <a:avLst/>
@@ -6926,7 +6926,7 @@
                 <a:ea typeface="等线 Light" panose="02010600030101010101" charset="-122"/>
                 <a:cs typeface="Courier New" panose="02070309020205020404" pitchFamily="49" charset="0"/>
               </a:rPr>
-              <a:t>Time based</a:t>
+              <a:t>Device Adaption </a:t>
             </a:r>
             <a:endParaRPr lang="en-US" altLang="zh-CN" sz="1000">
               <a:latin typeface="Courier New" panose="02070309020205020404" pitchFamily="49" charset="0"/>
@@ -6971,7 +6971,7 @@
                 <a:ea typeface="等线 Light" panose="02010600030101010101" charset="-122"/>
                 <a:cs typeface="Courier New" panose="02070309020205020404" pitchFamily="49" charset="0"/>
               </a:rPr>
-              <a:t>Fine Granularity</a:t>
+              <a:t>More Scenario</a:t>
             </a:r>
             <a:endParaRPr lang="en-US" altLang="zh-CN" sz="1000">
               <a:latin typeface="Courier New" panose="02070309020205020404" pitchFamily="49" charset="0"/>

</xml_diff>

<commit_message>
AC Battery based eRouter feature and roadmap updated.
</commit_message>
<xml_diff>
--- a/Reference_Implementation/images/energy_route_roadmap_milestone.pptx
+++ b/Reference_Implementation/images/energy_route_roadmap_milestone.pptx
@@ -8,15 +8,16 @@
     <p:notesMasterId r:id="rId4"/>
   </p:notesMasterIdLst>
   <p:handoutMasterIdLst>
-    <p:handoutMasterId r:id="rId5"/>
+    <p:handoutMasterId r:id="rId6"/>
   </p:handoutMasterIdLst>
   <p:sldIdLst>
     <p:sldId id="424" r:id="rId3"/>
+    <p:sldId id="425" r:id="rId5"/>
   </p:sldIdLst>
   <p:sldSz cx="12192000" cy="6858000"/>
   <p:notesSz cx="6858000" cy="9144000"/>
   <p:custDataLst>
-    <p:tags r:id="rId9"/>
+    <p:tags r:id="rId10"/>
   </p:custDataLst>
   <p:defaultTextStyle>
     <a:defPPr>
@@ -638,6 +639,54 @@
 </file>
 
 <file path=ppt/notesSlides/notesSlide1.xml><?xml version="1.0" encoding="utf-8"?>
+<p:notes xmlns:a="http://schemas.openxmlformats.org/drawingml/2006/main" xmlns:r="http://schemas.openxmlformats.org/officeDocument/2006/relationships" xmlns:p="http://schemas.openxmlformats.org/presentationml/2006/main">
+  <p:cSld>
+    <p:spTree>
+      <p:nvGrpSpPr>
+        <p:cNvPr id="1" name=""/>
+        <p:cNvGrpSpPr/>
+        <p:nvPr/>
+      </p:nvGrpSpPr>
+      <p:grpSpPr/>
+      <p:sp>
+        <p:nvSpPr>
+          <p:cNvPr id="2" name="幻灯片图像占位符 1"/>
+          <p:cNvSpPr>
+            <a:spLocks noGrp="1"/>
+          </p:cNvSpPr>
+          <p:nvPr>
+            <p:ph type="sldImg" idx="2"/>
+          </p:nvPr>
+        </p:nvSpPr>
+        <p:spPr/>
+      </p:sp>
+      <p:sp>
+        <p:nvSpPr>
+          <p:cNvPr id="3" name="文本占位符 2"/>
+          <p:cNvSpPr>
+            <a:spLocks noGrp="1"/>
+          </p:cNvSpPr>
+          <p:nvPr>
+            <p:ph type="body" idx="3"/>
+          </p:nvPr>
+        </p:nvSpPr>
+        <p:spPr/>
+        <p:txBody>
+          <a:bodyPr/>
+          <a:p>
+            <a:endParaRPr lang="zh-CN" altLang="en-US"/>
+          </a:p>
+        </p:txBody>
+      </p:sp>
+    </p:spTree>
+  </p:cSld>
+  <p:clrMapOvr>
+    <a:masterClrMapping/>
+  </p:clrMapOvr>
+</p:notes>
+</file>
+
+<file path=ppt/notesSlides/notesSlide2.xml><?xml version="1.0" encoding="utf-8"?>
 <p:notes xmlns:a="http://schemas.openxmlformats.org/drawingml/2006/main" xmlns:r="http://schemas.openxmlformats.org/officeDocument/2006/relationships" xmlns:p="http://schemas.openxmlformats.org/presentationml/2006/main">
   <p:cSld>
     <p:spTree>
@@ -5405,10 +5454,10 @@
                 <a:ea typeface="等线 Light" panose="02010600030101010101" charset="-122"/>
                 <a:cs typeface="Courier New" panose="02070309020205020404" pitchFamily="49" charset="0"/>
               </a:rPr>
-              <a:t> eRouter</a:t>
+              <a:t> </a:t>
             </a:r>
             <a:r>
-              <a:rPr lang="en-US" altLang="zh-CN" sz="1200" b="1">
+              <a:rPr lang="en-US" altLang="zh-CN" sz="1400" b="1">
                 <a:solidFill>
                   <a:srgbClr val="7030A0"/>
                 </a:solidFill>
@@ -5416,29 +5465,7 @@
                 <a:ea typeface="等线 Light" panose="02010600030101010101" charset="-122"/>
                 <a:cs typeface="Courier New" panose="02070309020205020404" pitchFamily="49" charset="0"/>
               </a:rPr>
-              <a:t> </a:t>
-            </a:r>
-            <a:r>
-              <a:rPr lang="en-US" altLang="zh-CN" sz="1400" b="1">
-                <a:solidFill>
-                  <a:schemeClr val="tx1"/>
-                </a:solidFill>
-                <a:latin typeface="Courier New" panose="02070309020205020404" pitchFamily="49" charset="0"/>
-                <a:ea typeface="等线 Light" panose="02010600030101010101" charset="-122"/>
-                <a:cs typeface="Courier New" panose="02070309020205020404" pitchFamily="49" charset="0"/>
-              </a:rPr>
-              <a:t>(Panel</a:t>
-            </a:r>
-            <a:r>
-              <a:rPr lang="zh-CN" altLang="en-US" sz="1400" b="1">
-                <a:solidFill>
-                  <a:schemeClr val="tx1"/>
-                </a:solidFill>
-                <a:latin typeface="Courier New" panose="02070309020205020404" pitchFamily="49" charset="0"/>
-                <a:ea typeface="等线 Light" panose="02010600030101010101" charset="-122"/>
-                <a:cs typeface="Courier New" panose="02070309020205020404" pitchFamily="49" charset="0"/>
-              </a:rPr>
-              <a:t>）</a:t>
+              <a:t>Energy Router</a:t>
             </a:r>
             <a:endParaRPr lang="zh-CN" altLang="en-US" sz="1400" b="1">
               <a:solidFill>
@@ -5512,7 +5539,7 @@
         </p:nvCxnSpPr>
         <p:spPr>
           <a:xfrm>
-            <a:off x="4737735" y="4673918"/>
+            <a:off x="4773295" y="4576128"/>
             <a:ext cx="1595755" cy="0"/>
           </a:xfrm>
           <a:prstGeom prst="straightConnector1">
@@ -5863,7 +5890,7 @@
         <p:spPr>
           <a:xfrm>
             <a:off x="4693920" y="2475230"/>
-            <a:ext cx="1866265" cy="299720"/>
+            <a:ext cx="2059940" cy="299720"/>
           </a:xfrm>
           <a:prstGeom prst="rect">
             <a:avLst/>
@@ -5889,7 +5916,7 @@
                 <a:ea typeface="等线 Light" panose="02010600030101010101" charset="-122"/>
                 <a:cs typeface="Courier New" panose="02070309020205020404" pitchFamily="49" charset="0"/>
               </a:rPr>
-              <a:t>#2 DC Coupling Hybrid</a:t>
+              <a:t>#2 DC Coupling (Hybrid)</a:t>
             </a:r>
             <a:endParaRPr lang="zh-CN" altLang="en-US" sz="1000">
               <a:latin typeface="Courier New" panose="02070309020205020404" pitchFamily="49" charset="0"/>
@@ -5908,7 +5935,7 @@
         <p:spPr>
           <a:xfrm>
             <a:off x="7244715" y="2475230"/>
-            <a:ext cx="1148715" cy="299720"/>
+            <a:ext cx="2192020" cy="299720"/>
           </a:xfrm>
           <a:prstGeom prst="rect">
             <a:avLst/>
@@ -5934,7 +5961,26 @@
                 <a:ea typeface="等线 Light" panose="02010600030101010101" charset="-122"/>
                 <a:cs typeface="Courier New" panose="02070309020205020404" pitchFamily="49" charset="0"/>
               </a:rPr>
-              <a:t>#3 SMB Based</a:t>
+              <a:t>#3 </a:t>
+            </a:r>
+            <a:r>
+              <a:rPr lang="en-US" altLang="zh-CN" sz="1000" b="1">
+                <a:solidFill>
+                  <a:srgbClr val="7030A0"/>
+                </a:solidFill>
+                <a:latin typeface="Courier New" panose="02070309020205020404" pitchFamily="49" charset="0"/>
+                <a:ea typeface="等线 Light" panose="02010600030101010101" charset="-122"/>
+                <a:cs typeface="Courier New" panose="02070309020205020404" pitchFamily="49" charset="0"/>
+              </a:rPr>
+              <a:t>AC Battery</a:t>
+            </a:r>
+            <a:r>
+              <a:rPr lang="en-US" altLang="zh-CN" sz="1000">
+                <a:latin typeface="Courier New" panose="02070309020205020404" pitchFamily="49" charset="0"/>
+                <a:ea typeface="等线 Light" panose="02010600030101010101" charset="-122"/>
+                <a:cs typeface="Courier New" panose="02070309020205020404" pitchFamily="49" charset="0"/>
+              </a:rPr>
+              <a:t>(SMB) Based</a:t>
             </a:r>
             <a:endParaRPr lang="zh-CN" altLang="en-US" sz="1000">
               <a:latin typeface="Courier New" panose="02070309020205020404" pitchFamily="49" charset="0"/>
@@ -6437,7 +6483,7 @@
         </p:nvSpPr>
         <p:spPr>
           <a:xfrm>
-            <a:off x="1120140" y="4576445"/>
+            <a:off x="1155700" y="4478655"/>
             <a:ext cx="1940560" cy="250825"/>
           </a:xfrm>
           <a:prstGeom prst="rect">
@@ -6581,7 +6627,7 @@
         </p:nvCxnSpPr>
         <p:spPr>
           <a:xfrm flipV="1">
-            <a:off x="6382385" y="5119053"/>
+            <a:off x="6382385" y="5119371"/>
             <a:ext cx="3070225" cy="0"/>
           </a:xfrm>
           <a:prstGeom prst="straightConnector1">
@@ -6989,7 +7035,7 @@
         </p:nvSpPr>
         <p:spPr>
           <a:xfrm>
-            <a:off x="4658360" y="4674235"/>
+            <a:off x="4693920" y="4576445"/>
             <a:ext cx="1804035" cy="299720"/>
           </a:xfrm>
           <a:prstGeom prst="rect">
@@ -7114,9 +7160,345 @@
           </a:p>
         </p:txBody>
       </p:sp>
+      <p:sp>
+        <p:nvSpPr>
+          <p:cNvPr id="3" name="文本框 2"/>
+          <p:cNvSpPr txBox="1"/>
+          <p:nvPr/>
+        </p:nvSpPr>
+        <p:spPr>
+          <a:xfrm>
+            <a:off x="4887595" y="5119370"/>
+            <a:ext cx="1027430" cy="299720"/>
+          </a:xfrm>
+          <a:prstGeom prst="rect">
+            <a:avLst/>
+          </a:prstGeom>
+          <a:noFill/>
+        </p:spPr>
+        <p:txBody>
+          <a:bodyPr wrap="square" rtlCol="0" anchor="t">
+            <a:spAutoFit/>
+          </a:bodyPr>
+          <a:p>
+            <a:pPr algn="l">
+              <a:lnSpc>
+                <a:spcPts val="1625"/>
+              </a:lnSpc>
+              <a:buClrTx/>
+              <a:buSzTx/>
+              <a:buFontTx/>
+            </a:pPr>
+            <a:r>
+              <a:rPr lang="en-US" altLang="zh-CN" sz="1000">
+                <a:solidFill>
+                  <a:srgbClr val="7030A0"/>
+                </a:solidFill>
+                <a:latin typeface="Courier New" panose="02070309020205020404" pitchFamily="49" charset="0"/>
+                <a:ea typeface="等线 Light" panose="02010600030101010101" charset="-122"/>
+                <a:cs typeface="Courier New" panose="02070309020205020404" pitchFamily="49" charset="0"/>
+              </a:rPr>
+              <a:t>White Paper</a:t>
+            </a:r>
+            <a:endParaRPr lang="en-US" altLang="zh-CN" sz="1000">
+              <a:solidFill>
+                <a:srgbClr val="7030A0"/>
+              </a:solidFill>
+              <a:latin typeface="Courier New" panose="02070309020205020404" pitchFamily="49" charset="0"/>
+              <a:ea typeface="等线 Light" panose="02010600030101010101" charset="-122"/>
+              <a:cs typeface="Courier New" panose="02070309020205020404" pitchFamily="49" charset="0"/>
+            </a:endParaRPr>
+          </a:p>
+        </p:txBody>
+      </p:sp>
+      <p:cxnSp>
+        <p:nvCxnSpPr>
+          <p:cNvPr id="7" name="直接箭头连接符 2"/>
+          <p:cNvCxnSpPr/>
+          <p:nvPr/>
+        </p:nvCxnSpPr>
+        <p:spPr>
+          <a:xfrm>
+            <a:off x="5044440" y="5119371"/>
+            <a:ext cx="389255" cy="0"/>
+          </a:xfrm>
+          <a:prstGeom prst="straightConnector1">
+            <a:avLst/>
+          </a:prstGeom>
+          <a:ln w="38100">
+            <a:solidFill>
+              <a:srgbClr val="7030A0"/>
+            </a:solidFill>
+            <a:tailEnd type="triangle" w="sm" len="lg"/>
+          </a:ln>
+        </p:spPr>
+        <p:style>
+          <a:lnRef idx="1">
+            <a:schemeClr val="accent1"/>
+          </a:lnRef>
+          <a:fillRef idx="0">
+            <a:schemeClr val="accent1"/>
+          </a:fillRef>
+          <a:effectRef idx="0">
+            <a:schemeClr val="accent1"/>
+          </a:effectRef>
+          <a:fontRef idx="minor">
+            <a:schemeClr val="tx1"/>
+          </a:fontRef>
+        </p:style>
+      </p:cxnSp>
     </p:spTree>
     <p:custDataLst>
       <p:tags r:id="rId1"/>
+    </p:custDataLst>
+  </p:cSld>
+  <p:clrMapOvr>
+    <a:masterClrMapping/>
+  </p:clrMapOvr>
+</p:sld>
+</file>
+
+<file path=ppt/slides/slide2.xml><?xml version="1.0" encoding="utf-8"?>
+<p:sld xmlns:a="http://schemas.openxmlformats.org/drawingml/2006/main" xmlns:r="http://schemas.openxmlformats.org/officeDocument/2006/relationships" xmlns:p="http://schemas.openxmlformats.org/presentationml/2006/main">
+  <p:cSld>
+    <p:spTree>
+      <p:nvGrpSpPr>
+        <p:cNvPr id="1" name=""/>
+        <p:cNvGrpSpPr/>
+        <p:nvPr/>
+      </p:nvGrpSpPr>
+      <p:grpSpPr>
+        <a:xfrm>
+          <a:off x="0" y="0"/>
+          <a:ext cx="0" cy="0"/>
+          <a:chOff x="0" y="0"/>
+          <a:chExt cx="0" cy="0"/>
+        </a:xfrm>
+      </p:grpSpPr>
+      <p:pic>
+        <p:nvPicPr>
+          <p:cNvPr id="3" name="图片 2"/>
+          <p:cNvPicPr/>
+          <p:nvPr/>
+        </p:nvPicPr>
+        <p:blipFill>
+          <a:blip r:embed="rId1">
+            <a:alphaModFix amt="30000"/>
+            <a:grayscl/>
+          </a:blip>
+          <a:stretch>
+            <a:fillRect/>
+          </a:stretch>
+        </p:blipFill>
+        <p:spPr>
+          <a:xfrm>
+            <a:off x="700405" y="161925"/>
+            <a:ext cx="10977245" cy="6542405"/>
+          </a:xfrm>
+          <a:prstGeom prst="rect">
+            <a:avLst/>
+          </a:prstGeom>
+          <a:noFill/>
+          <a:ln w="9525">
+            <a:noFill/>
+          </a:ln>
+        </p:spPr>
+      </p:pic>
+      <p:pic>
+        <p:nvPicPr>
+          <p:cNvPr id="7" name="图片 6"/>
+          <p:cNvPicPr>
+            <a:picLocks noChangeAspect="1"/>
+          </p:cNvPicPr>
+          <p:nvPr/>
+        </p:nvPicPr>
+        <p:blipFill>
+          <a:blip r:embed="rId2"/>
+          <a:stretch>
+            <a:fillRect/>
+          </a:stretch>
+        </p:blipFill>
+        <p:spPr>
+          <a:xfrm>
+            <a:off x="7218680" y="968375"/>
+            <a:ext cx="4217670" cy="1841500"/>
+          </a:xfrm>
+          <a:prstGeom prst="rect">
+            <a:avLst/>
+          </a:prstGeom>
+        </p:spPr>
+      </p:pic>
+      <p:cxnSp>
+        <p:nvCxnSpPr>
+          <p:cNvPr id="10" name="直接连接符 9"/>
+          <p:cNvCxnSpPr/>
+          <p:nvPr/>
+        </p:nvCxnSpPr>
+        <p:spPr>
+          <a:xfrm flipH="1">
+            <a:off x="6823075" y="1225550"/>
+            <a:ext cx="497840" cy="358775"/>
+          </a:xfrm>
+          <a:prstGeom prst="line">
+            <a:avLst/>
+          </a:prstGeom>
+          <a:ln w="6350">
+            <a:solidFill>
+              <a:srgbClr val="C00000"/>
+            </a:solidFill>
+            <a:prstDash val="dash"/>
+          </a:ln>
+        </p:spPr>
+        <p:style>
+          <a:lnRef idx="2">
+            <a:schemeClr val="accent1"/>
+          </a:lnRef>
+          <a:fillRef idx="0">
+            <a:srgbClr val="FFFFFF"/>
+          </a:fillRef>
+          <a:effectRef idx="0">
+            <a:srgbClr val="FFFFFF"/>
+          </a:effectRef>
+          <a:fontRef idx="minor">
+            <a:schemeClr val="tx1"/>
+          </a:fontRef>
+        </p:style>
+      </p:cxnSp>
+      <p:cxnSp>
+        <p:nvCxnSpPr>
+          <p:cNvPr id="13" name="直接连接符 12"/>
+          <p:cNvCxnSpPr/>
+          <p:nvPr/>
+        </p:nvCxnSpPr>
+        <p:spPr>
+          <a:xfrm flipH="1" flipV="1">
+            <a:off x="6837680" y="2385695"/>
+            <a:ext cx="483235" cy="300990"/>
+          </a:xfrm>
+          <a:prstGeom prst="line">
+            <a:avLst/>
+          </a:prstGeom>
+          <a:ln w="6350">
+            <a:solidFill>
+              <a:srgbClr val="C00000"/>
+            </a:solidFill>
+            <a:prstDash val="dash"/>
+          </a:ln>
+        </p:spPr>
+        <p:style>
+          <a:lnRef idx="2">
+            <a:schemeClr val="accent1"/>
+          </a:lnRef>
+          <a:fillRef idx="0">
+            <a:srgbClr val="FFFFFF"/>
+          </a:fillRef>
+          <a:effectRef idx="0">
+            <a:srgbClr val="FFFFFF"/>
+          </a:effectRef>
+          <a:fontRef idx="minor">
+            <a:schemeClr val="tx1"/>
+          </a:fontRef>
+        </p:style>
+      </p:cxnSp>
+      <p:pic>
+        <p:nvPicPr>
+          <p:cNvPr id="20" name="图片 19"/>
+          <p:cNvPicPr>
+            <a:picLocks noChangeAspect="1"/>
+          </p:cNvPicPr>
+          <p:nvPr/>
+        </p:nvPicPr>
+        <p:blipFill>
+          <a:blip r:embed="rId3"/>
+          <a:stretch>
+            <a:fillRect/>
+          </a:stretch>
+        </p:blipFill>
+        <p:spPr>
+          <a:xfrm>
+            <a:off x="4055110" y="4163060"/>
+            <a:ext cx="3686175" cy="1958340"/>
+          </a:xfrm>
+          <a:prstGeom prst="rect">
+            <a:avLst/>
+          </a:prstGeom>
+        </p:spPr>
+      </p:pic>
+      <p:cxnSp>
+        <p:nvCxnSpPr>
+          <p:cNvPr id="12" name="直接连接符 11"/>
+          <p:cNvCxnSpPr/>
+          <p:nvPr/>
+        </p:nvCxnSpPr>
+        <p:spPr>
+          <a:xfrm flipH="1" flipV="1">
+            <a:off x="3616960" y="5535930"/>
+            <a:ext cx="530860" cy="409575"/>
+          </a:xfrm>
+          <a:prstGeom prst="line">
+            <a:avLst/>
+          </a:prstGeom>
+          <a:ln w="6350">
+            <a:solidFill>
+              <a:srgbClr val="C00000"/>
+            </a:solidFill>
+            <a:prstDash val="dash"/>
+          </a:ln>
+        </p:spPr>
+        <p:style>
+          <a:lnRef idx="2">
+            <a:schemeClr val="accent1"/>
+          </a:lnRef>
+          <a:fillRef idx="0">
+            <a:srgbClr val="FFFFFF"/>
+          </a:fillRef>
+          <a:effectRef idx="0">
+            <a:srgbClr val="FFFFFF"/>
+          </a:effectRef>
+          <a:fontRef idx="minor">
+            <a:schemeClr val="tx1"/>
+          </a:fontRef>
+        </p:style>
+      </p:cxnSp>
+      <p:cxnSp>
+        <p:nvCxnSpPr>
+          <p:cNvPr id="16" name="直接连接符 15"/>
+          <p:cNvCxnSpPr/>
+          <p:nvPr/>
+        </p:nvCxnSpPr>
+        <p:spPr>
+          <a:xfrm flipH="1">
+            <a:off x="3597910" y="4452620"/>
+            <a:ext cx="549910" cy="396240"/>
+          </a:xfrm>
+          <a:prstGeom prst="line">
+            <a:avLst/>
+          </a:prstGeom>
+          <a:ln w="6350">
+            <a:solidFill>
+              <a:srgbClr val="C00000"/>
+            </a:solidFill>
+            <a:prstDash val="dash"/>
+          </a:ln>
+        </p:spPr>
+        <p:style>
+          <a:lnRef idx="2">
+            <a:schemeClr val="accent1"/>
+          </a:lnRef>
+          <a:fillRef idx="0">
+            <a:srgbClr val="FFFFFF"/>
+          </a:fillRef>
+          <a:effectRef idx="0">
+            <a:srgbClr val="FFFFFF"/>
+          </a:effectRef>
+          <a:fontRef idx="minor">
+            <a:schemeClr val="tx1"/>
+          </a:fontRef>
+        </p:style>
+      </p:cxnSp>
+    </p:spTree>
+    <p:custDataLst>
+      <p:tags r:id="rId4"/>
     </p:custDataLst>
   </p:cSld>
   <p:clrMapOvr>
@@ -7920,6 +8302,27 @@
 
 <file path=ppt/tags/tag64.xml><?xml version="1.0" encoding="utf-8"?>
 <p:tagLst xmlns:p="http://schemas.openxmlformats.org/presentationml/2006/main">
+  <p:tag name="KSO_WM_SLIDE_ID" val="custom20205081_1"/>
+  <p:tag name="KSO_WM_TEMPLATE_SUBCATEGORY" val="19"/>
+  <p:tag name="KSO_WM_TEMPLATE_MASTER_TYPE" val="0"/>
+  <p:tag name="KSO_WM_TEMPLATE_COLOR_TYPE" val="1"/>
+  <p:tag name="KSO_WM_SLIDE_TYPE" val="title"/>
+  <p:tag name="KSO_WM_SLIDE_SUBTYPE" val="defaultBlank"/>
+  <p:tag name="KSO_WM_SLIDE_ITEM_CNT" val="0"/>
+  <p:tag name="KSO_WM_SLIDE_INDEX" val="1"/>
+  <p:tag name="KSO_WM_TAG_VERSION" val="1.0"/>
+  <p:tag name="KSO_WM_BEAUTIFY_FLAG" val="#wm#"/>
+  <p:tag name="KSO_WM_TEMPLATE_CATEGORY" val="custom"/>
+  <p:tag name="KSO_WM_TEMPLATE_INDEX" val="20205081"/>
+  <p:tag name="KSO_WM_SLIDE_LAYOUT" val="a_b"/>
+  <p:tag name="KSO_WM_SLIDE_LAYOUT_CNT" val="1_1"/>
+  <p:tag name="KSO_WM_UNIT_SHOW_EDIT_AREA_INDICATION" val="1"/>
+  <p:tag name="KSO_WM_TEMPLATE_THUMBS_INDEX" val="1、4、7、12、13、14、15、16、17、18、20、24、25、28、33、36、40、43、44"/>
+</p:tagLst>
+</file>
+
+<file path=ppt/tags/tag65.xml><?xml version="1.0" encoding="utf-8"?>
+<p:tagLst xmlns:p="http://schemas.openxmlformats.org/presentationml/2006/main">
   <p:tag name="commondata" val="eyJoZGlkIjoiZmMwMDQ3NmU4NjU1OWFiNjEwNGQwZTA3YTg5MDBlN2UifQ=="/>
 </p:tagLst>
 </file>

</xml_diff>